<commit_message>
Topic 3 and 4 update
</commit_message>
<xml_diff>
--- a/topic-04-JavaScript-3/talk-1/talk-1.pptx
+++ b/topic-04-JavaScript-3/talk-1/talk-1.pptx
@@ -134,7 +134,7 @@
   </p:defaultTextStyle>
   <p:extLst>
     <p:ext uri="{EFAFB233-063F-42B5-8137-9DF3F51BA10A}">
-      <p15:sldGuideLst xmlns="" xmlns:p15="http://schemas.microsoft.com/office/powerpoint/2012/main">
+      <p15:sldGuideLst xmlns:p15="http://schemas.microsoft.com/office/powerpoint/2012/main" xmlns="">
         <p15:guide id="1" orient="horz" pos="2160">
           <p15:clr>
             <a:srgbClr val="A4A3A4"/>
@@ -233,7 +233,7 @@
           <a:p>
             <a:fld id="{31E3A3E0-0EEC-43C3-B8B8-6A5D051024B7}" type="datetimeFigureOut">
               <a:rPr lang="en-US" smtClean="0"/>
-              <a:t>1/30/2018</a:t>
+              <a:t>2/1/2018</a:t>
             </a:fld>
             <a:endParaRPr lang="en-US"/>
           </a:p>
@@ -5341,7 +5341,7 @@
           <a:p>
             <a:fld id="{4BC48473-ACCD-4242-806A-1249CC2C55A8}" type="datetimeFigureOut">
               <a:rPr lang="en-US" smtClean="0"/>
-              <a:t>1/30/2018</a:t>
+              <a:t>2/1/2018</a:t>
             </a:fld>
             <a:endParaRPr lang="en-US"/>
           </a:p>
@@ -5617,7 +5617,7 @@
           <a:p>
             <a:fld id="{4BC48473-ACCD-4242-806A-1249CC2C55A8}" type="datetimeFigureOut">
               <a:rPr lang="en-US" smtClean="0"/>
-              <a:t>1/30/2018</a:t>
+              <a:t>2/1/2018</a:t>
             </a:fld>
             <a:endParaRPr lang="en-US"/>
           </a:p>
@@ -5797,7 +5797,7 @@
           <a:p>
             <a:fld id="{4BC48473-ACCD-4242-806A-1249CC2C55A8}" type="datetimeFigureOut">
               <a:rPr lang="en-US" smtClean="0"/>
-              <a:t>1/30/2018</a:t>
+              <a:t>2/1/2018</a:t>
             </a:fld>
             <a:endParaRPr lang="en-US"/>
           </a:p>
@@ -5967,7 +5967,7 @@
           <a:p>
             <a:fld id="{4BC48473-ACCD-4242-806A-1249CC2C55A8}" type="datetimeFigureOut">
               <a:rPr lang="en-US" smtClean="0"/>
-              <a:t>1/30/2018</a:t>
+              <a:t>2/1/2018</a:t>
             </a:fld>
             <a:endParaRPr lang="en-US"/>
           </a:p>
@@ -6563,7 +6563,7 @@
           <a:p>
             <a:fld id="{4BC48473-ACCD-4242-806A-1249CC2C55A8}" type="datetimeFigureOut">
               <a:rPr lang="en-US" smtClean="0"/>
-              <a:t>1/30/2018</a:t>
+              <a:t>2/1/2018</a:t>
             </a:fld>
             <a:endParaRPr lang="en-US"/>
           </a:p>
@@ -8369,7 +8369,7 @@
           <a:p>
             <a:fld id="{4BC48473-ACCD-4242-806A-1249CC2C55A8}" type="datetimeFigureOut">
               <a:rPr lang="en-US" smtClean="0"/>
-              <a:t>1/30/2018</a:t>
+              <a:t>2/1/2018</a:t>
             </a:fld>
             <a:endParaRPr lang="en-US"/>
           </a:p>
@@ -8429,7 +8429,7 @@
   </p:clrMapOvr>
   <p:extLst mod="1">
     <p:ext uri="{DCECCB84-F9BA-43D5-87BE-67443E8EF086}">
-      <p15:sldGuideLst xmlns="" xmlns:p15="http://schemas.microsoft.com/office/powerpoint/2012/main"/>
+      <p15:sldGuideLst xmlns:p15="http://schemas.microsoft.com/office/powerpoint/2012/main" xmlns=""/>
     </p:ext>
   </p:extLst>
 </p:sldLayout>
@@ -8759,7 +8759,7 @@
           <a:p>
             <a:fld id="{4BC48473-ACCD-4242-806A-1249CC2C55A8}" type="datetimeFigureOut">
               <a:rPr lang="en-US" smtClean="0"/>
-              <a:t>1/30/2018</a:t>
+              <a:t>2/1/2018</a:t>
             </a:fld>
             <a:endParaRPr lang="en-US"/>
           </a:p>
@@ -8819,7 +8819,7 @@
   </p:clrMapOvr>
   <p:extLst mod="1">
     <p:ext uri="{DCECCB84-F9BA-43D5-87BE-67443E8EF086}">
-      <p15:sldGuideLst xmlns="" xmlns:p15="http://schemas.microsoft.com/office/powerpoint/2012/main"/>
+      <p15:sldGuideLst xmlns:p15="http://schemas.microsoft.com/office/powerpoint/2012/main" xmlns=""/>
     </p:ext>
   </p:extLst>
 </p:sldLayout>
@@ -8882,7 +8882,7 @@
           <a:p>
             <a:fld id="{4BC48473-ACCD-4242-806A-1249CC2C55A8}" type="datetimeFigureOut">
               <a:rPr lang="en-US" smtClean="0"/>
-              <a:t>1/30/2018</a:t>
+              <a:t>2/1/2018</a:t>
             </a:fld>
             <a:endParaRPr lang="en-US"/>
           </a:p>
@@ -8977,7 +8977,7 @@
           <a:p>
             <a:fld id="{4BC48473-ACCD-4242-806A-1249CC2C55A8}" type="datetimeFigureOut">
               <a:rPr lang="en-US" smtClean="0"/>
-              <a:t>1/30/2018</a:t>
+              <a:t>2/1/2018</a:t>
             </a:fld>
             <a:endParaRPr lang="en-US"/>
           </a:p>
@@ -9742,7 +9742,7 @@
           <a:p>
             <a:fld id="{4BC48473-ACCD-4242-806A-1249CC2C55A8}" type="datetimeFigureOut">
               <a:rPr lang="en-US" smtClean="0"/>
-              <a:t>1/30/2018</a:t>
+              <a:t>2/1/2018</a:t>
             </a:fld>
             <a:endParaRPr lang="en-US"/>
           </a:p>
@@ -9888,7 +9888,7 @@
   </p:clrMapOvr>
   <p:extLst mod="1">
     <p:ext uri="{DCECCB84-F9BA-43D5-87BE-67443E8EF086}">
-      <p15:sldGuideLst xmlns="" xmlns:p15="http://schemas.microsoft.com/office/powerpoint/2012/main">
+      <p15:sldGuideLst xmlns:p15="http://schemas.microsoft.com/office/powerpoint/2012/main" xmlns="">
         <p15:guide id="1" orient="horz" pos="696">
           <p15:clr>
             <a:srgbClr val="FBAE40"/>
@@ -10622,7 +10622,7 @@
           <a:p>
             <a:fld id="{4BC48473-ACCD-4242-806A-1249CC2C55A8}" type="datetimeFigureOut">
               <a:rPr lang="en-US" smtClean="0"/>
-              <a:t>1/30/2018</a:t>
+              <a:t>2/1/2018</a:t>
             </a:fld>
             <a:endParaRPr lang="en-US"/>
           </a:p>
@@ -10887,7 +10887,7 @@
           <a:p>
             <a:fld id="{4BC48473-ACCD-4242-806A-1249CC2C55A8}" type="datetimeFigureOut">
               <a:rPr lang="en-US" smtClean="0"/>
-              <a:t>1/30/2018</a:t>
+              <a:t>2/1/2018</a:t>
             </a:fld>
             <a:endParaRPr lang="en-US"/>
           </a:p>
@@ -11505,7 +11505,7 @@
   </p:txStyles>
   <p:extLst mod="1">
     <p:ext uri="{27BBF7A9-308A-43DC-89C8-2F10F3537804}">
-      <p15:sldGuideLst xmlns="" xmlns:p15="http://schemas.microsoft.com/office/powerpoint/2012/main">
+      <p15:sldGuideLst xmlns:p15="http://schemas.microsoft.com/office/powerpoint/2012/main" xmlns="">
         <p15:guide id="1" pos="792">
           <p15:clr>
             <a:srgbClr val="F26B43"/>
@@ -12722,11 +12722,13 @@
         <p:spPr>
           <a:xfrm>
             <a:off x="938758" y="1295400"/>
-            <a:ext cx="7633742" cy="4584193"/>
+            <a:ext cx="7633742" cy="5029200"/>
           </a:xfrm>
         </p:spPr>
         <p:txBody>
-          <a:bodyPr/>
+          <a:bodyPr>
+            <a:normAutofit/>
+          </a:bodyPr>
           <a:lstStyle/>
           <a:p>
             <a:pPr marL="0" indent="0">
@@ -12816,6 +12818,135 @@
               </a:rPr>
               <a:t>');</a:t>
             </a:r>
+          </a:p>
+          <a:p>
+            <a:pPr marL="165100" indent="60325">
+              <a:buNone/>
+            </a:pPr>
+            <a:endParaRPr lang="en-US" dirty="0">
+              <a:latin typeface="Courier New" panose="02070309020205020404" pitchFamily="49" charset="0"/>
+              <a:cs typeface="Courier New" panose="02070309020205020404" pitchFamily="49" charset="0"/>
+            </a:endParaRPr>
+          </a:p>
+          <a:p>
+            <a:pPr marL="225425" indent="-225425"/>
+            <a:r>
+              <a:rPr lang="en-US" dirty="0" err="1"/>
+              <a:t>getElementsByTagName</a:t>
+            </a:r>
+            <a:r>
+              <a:rPr lang="en-US" dirty="0" smtClean="0"/>
+              <a:t>(),  </a:t>
+            </a:r>
+            <a:r>
+              <a:rPr lang="en-US" dirty="0" err="1" smtClean="0"/>
+              <a:t>getElementsByClassName</a:t>
+            </a:r>
+            <a:r>
+              <a:rPr lang="en-US" dirty="0" smtClean="0"/>
+              <a:t>(), and </a:t>
+            </a:r>
+            <a:r>
+              <a:rPr lang="en-US" dirty="0" err="1" smtClean="0"/>
+              <a:t>querySelectorAll</a:t>
+            </a:r>
+            <a:r>
+              <a:rPr lang="en-US" dirty="0" smtClean="0"/>
+              <a:t>() return </a:t>
+            </a:r>
+            <a:r>
+              <a:rPr lang="en-US" dirty="0"/>
+              <a:t>more than one element </a:t>
+            </a:r>
+            <a:r>
+              <a:rPr lang="en-US" dirty="0" smtClean="0"/>
+              <a:t>as </a:t>
+            </a:r>
+            <a:r>
+              <a:rPr lang="en-US" dirty="0"/>
+              <a:t>a </a:t>
+            </a:r>
+            <a:r>
+              <a:rPr lang="en-US" dirty="0" err="1" smtClean="0"/>
+              <a:t>NodeList</a:t>
+            </a:r>
+            <a:r>
+              <a:rPr lang="en-US" dirty="0" smtClean="0"/>
+              <a:t>.</a:t>
+            </a:r>
+          </a:p>
+          <a:p>
+            <a:pPr marL="225425" indent="-225425"/>
+            <a:r>
+              <a:rPr lang="en-US" dirty="0" smtClean="0"/>
+              <a:t>For example, </a:t>
+            </a:r>
+            <a:r>
+              <a:rPr lang="en-US" dirty="0" smtClean="0">
+                <a:cs typeface="Courier New" panose="02070309020205020404" pitchFamily="49" charset="0"/>
+              </a:rPr>
+              <a:t>return the </a:t>
+            </a:r>
+            <a:r>
+              <a:rPr lang="en-US" dirty="0">
+                <a:cs typeface="Courier New" panose="02070309020205020404" pitchFamily="49" charset="0"/>
+              </a:rPr>
+              <a:t>first element from the above </a:t>
+            </a:r>
+            <a:r>
+              <a:rPr lang="en-US" dirty="0" smtClean="0">
+                <a:cs typeface="Courier New" panose="02070309020205020404" pitchFamily="49" charset="0"/>
+              </a:rPr>
+              <a:t>example use:</a:t>
+            </a:r>
+            <a:endParaRPr lang="en-US" dirty="0">
+              <a:cs typeface="Courier New" panose="02070309020205020404" pitchFamily="49" charset="0"/>
+            </a:endParaRPr>
+          </a:p>
+          <a:p>
+            <a:pPr marL="225425" indent="0">
+              <a:buNone/>
+            </a:pPr>
+            <a:r>
+              <a:rPr lang="en-US" dirty="0" err="1" smtClean="0">
+                <a:latin typeface="Courier New" panose="02070309020205020404" pitchFamily="49" charset="0"/>
+                <a:cs typeface="Courier New" panose="02070309020205020404" pitchFamily="49" charset="0"/>
+              </a:rPr>
+              <a:t>els</a:t>
+            </a:r>
+            <a:r>
+              <a:rPr lang="en-US" dirty="0" smtClean="0">
+                <a:latin typeface="Courier New" panose="02070309020205020404" pitchFamily="49" charset="0"/>
+                <a:cs typeface="Courier New" panose="02070309020205020404" pitchFamily="49" charset="0"/>
+              </a:rPr>
+              <a:t>[0] </a:t>
+            </a:r>
+          </a:p>
+          <a:p>
+            <a:pPr marL="225425" indent="-225425"/>
+            <a:r>
+              <a:rPr lang="en-US" dirty="0" smtClean="0"/>
+              <a:t>If we want to traverse all the elements returned in the </a:t>
+            </a:r>
+            <a:r>
+              <a:rPr lang="en-US" dirty="0" err="1" smtClean="0"/>
+              <a:t>NodeList</a:t>
+            </a:r>
+            <a:r>
+              <a:rPr lang="en-US" dirty="0" smtClean="0"/>
+              <a:t>, we </a:t>
+            </a:r>
+            <a:r>
+              <a:rPr lang="en-US" dirty="0"/>
+              <a:t>will need a </a:t>
+            </a:r>
+            <a:r>
+              <a:rPr lang="en-US" dirty="0" smtClean="0"/>
+              <a:t>loop.</a:t>
+            </a:r>
+            <a:endParaRPr lang="en-US" dirty="0" smtClean="0">
+              <a:cs typeface="Courier New" panose="02070309020205020404" pitchFamily="49" charset="0"/>
+            </a:endParaRPr>
           </a:p>
           <a:p>
             <a:pPr marL="0" indent="0">
@@ -12920,14 +13051,12 @@
               <a:rPr lang="en-US" sz="2400" dirty="0" smtClean="0"/>
               <a:t>Document Object Model</a:t>
             </a:r>
-            <a:endParaRPr lang="en-US" sz="2400" dirty="0" smtClean="0"/>
           </a:p>
           <a:p>
             <a:r>
               <a:rPr lang="en-US" sz="2400" dirty="0" smtClean="0"/>
               <a:t>Accessing Elements</a:t>
             </a:r>
-            <a:endParaRPr lang="en-US" sz="2400" dirty="0" smtClean="0"/>
           </a:p>
           <a:p>
             <a:r>
@@ -12941,7 +13070,6 @@
               <a:rPr lang="en-US" sz="2400" dirty="0" smtClean="0"/>
               <a:t>Events</a:t>
             </a:r>
-            <a:endParaRPr lang="en-US" sz="2400" dirty="0" smtClean="0"/>
           </a:p>
           <a:p>
             <a:endParaRPr lang="en-US" dirty="0"/>
@@ -13341,7 +13469,6 @@
               <a:rPr lang="en-US" altLang="en-US" sz="5400" dirty="0" smtClean="0"/>
               <a:t>Accessing form elements</a:t>
             </a:r>
-            <a:endParaRPr lang="en-US" altLang="en-US" sz="5400" dirty="0" smtClean="0"/>
           </a:p>
         </p:txBody>
       </p:sp>
@@ -13494,10 +13621,6 @@
               </a:rPr>
               <a:t>("days").value=2;</a:t>
             </a:r>
-            <a:endParaRPr lang="en-US" dirty="0">
-              <a:latin typeface="Courier New" panose="02070309020205020404" pitchFamily="49" charset="0"/>
-              <a:cs typeface="Courier New" panose="02070309020205020404" pitchFamily="49" charset="0"/>
-            </a:endParaRPr>
           </a:p>
         </p:txBody>
       </p:sp>
@@ -13732,7 +13855,6 @@
               <a:rPr lang="en-US" altLang="en-US" sz="5400" dirty="0" smtClean="0"/>
               <a:t>Accessing form elements</a:t>
             </a:r>
-            <a:endParaRPr lang="en-US" altLang="en-US" sz="5400" dirty="0" smtClean="0"/>
           </a:p>
         </p:txBody>
       </p:sp>
@@ -13963,10 +14085,6 @@
               </a:rPr>
               <a:t>}</a:t>
             </a:r>
-            <a:endParaRPr lang="en-US" sz="5000" dirty="0">
-              <a:latin typeface="Courier New" panose="02070309020205020404" pitchFamily="49" charset="0"/>
-              <a:cs typeface="Courier New" panose="02070309020205020404" pitchFamily="49" charset="0"/>
-            </a:endParaRPr>
           </a:p>
         </p:txBody>
       </p:sp>
@@ -14201,7 +14319,6 @@
               <a:rPr lang="en-US" altLang="en-US" sz="5400" dirty="0" smtClean="0"/>
               <a:t>Accessing form elements</a:t>
             </a:r>
-            <a:endParaRPr lang="en-US" altLang="en-US" sz="5400" dirty="0" smtClean="0"/>
           </a:p>
         </p:txBody>
       </p:sp>
@@ -14630,7 +14747,6 @@
               <a:rPr lang="en-US" altLang="en-US" sz="5400" dirty="0" smtClean="0"/>
               <a:t>Accessing form elements</a:t>
             </a:r>
-            <a:endParaRPr lang="en-US" altLang="en-US" sz="5400" dirty="0" smtClean="0"/>
           </a:p>
         </p:txBody>
       </p:sp>
@@ -14960,7 +15076,6 @@
               <a:rPr lang="en-US" altLang="en-US" sz="5400" dirty="0" smtClean="0"/>
               <a:t>Accessing form elements</a:t>
             </a:r>
-            <a:endParaRPr lang="en-US" altLang="en-US" sz="5400" dirty="0" smtClean="0"/>
           </a:p>
         </p:txBody>
       </p:sp>
@@ -15304,14 +15419,12 @@
               <a:rPr lang="en-US" sz="2400" dirty="0" smtClean="0"/>
               <a:t>Document Object Model</a:t>
             </a:r>
-            <a:endParaRPr lang="en-US" sz="2400" dirty="0" smtClean="0"/>
           </a:p>
           <a:p>
             <a:r>
               <a:rPr lang="en-US" sz="2400" dirty="0" smtClean="0"/>
               <a:t>Accessing Elements</a:t>
             </a:r>
-            <a:endParaRPr lang="en-US" sz="2400" dirty="0" smtClean="0"/>
           </a:p>
           <a:p>
             <a:r>
@@ -15325,7 +15438,6 @@
               <a:rPr lang="en-US" sz="2400" dirty="0" smtClean="0"/>
               <a:t>Events</a:t>
             </a:r>
-            <a:endParaRPr lang="en-US" sz="2400" dirty="0" smtClean="0"/>
           </a:p>
           <a:p>
             <a:endParaRPr lang="en-US" dirty="0"/>
@@ -15589,14 +15701,12 @@
               <a:rPr lang="en-US" sz="2400" dirty="0" smtClean="0"/>
               <a:t>Document Object Model</a:t>
             </a:r>
-            <a:endParaRPr lang="en-US" sz="2400" dirty="0" smtClean="0"/>
           </a:p>
           <a:p>
             <a:r>
               <a:rPr lang="en-US" sz="2400" dirty="0" smtClean="0"/>
               <a:t>Accessing Elements</a:t>
             </a:r>
-            <a:endParaRPr lang="en-US" sz="2400" dirty="0" smtClean="0"/>
           </a:p>
           <a:p>
             <a:r>
@@ -15610,7 +15720,6 @@
               <a:rPr lang="en-US" sz="2400" dirty="0" smtClean="0"/>
               <a:t>Events</a:t>
             </a:r>
-            <a:endParaRPr lang="en-US" sz="2400" dirty="0" smtClean="0"/>
           </a:p>
           <a:p>
             <a:endParaRPr lang="en-US" dirty="0"/>
@@ -16010,7 +16119,6 @@
               <a:rPr lang="en-US" altLang="en-US" sz="5400" dirty="0" smtClean="0"/>
               <a:t>events</a:t>
             </a:r>
-            <a:endParaRPr lang="en-US" altLang="en-US" sz="5400" dirty="0" smtClean="0"/>
           </a:p>
         </p:txBody>
       </p:sp>
@@ -16311,7 +16419,6 @@
               <a:rPr lang="en-US" altLang="en-US" sz="5400" dirty="0" smtClean="0"/>
               <a:t>events</a:t>
             </a:r>
-            <a:endParaRPr lang="en-US" altLang="en-US" sz="5400" dirty="0" smtClean="0"/>
           </a:p>
         </p:txBody>
       </p:sp>
@@ -16575,7 +16682,6 @@
               <a:rPr lang="en-US" altLang="en-US" sz="5400" dirty="0" smtClean="0"/>
               <a:t>events</a:t>
             </a:r>
-            <a:endParaRPr lang="en-US" altLang="en-US" sz="5400" dirty="0" smtClean="0"/>
           </a:p>
         </p:txBody>
       </p:sp>
@@ -16878,7 +16984,6 @@
               <a:rPr lang="en-US" altLang="en-US" sz="5400" dirty="0" smtClean="0"/>
               <a:t>events</a:t>
             </a:r>
-            <a:endParaRPr lang="en-US" altLang="en-US" sz="5400" dirty="0" smtClean="0"/>
           </a:p>
         </p:txBody>
       </p:sp>
@@ -17216,7 +17321,6 @@
               <a:rPr lang="en-US" altLang="en-US" sz="5400" dirty="0" smtClean="0"/>
               <a:t>events</a:t>
             </a:r>
-            <a:endParaRPr lang="en-US" altLang="en-US" sz="5400" dirty="0" smtClean="0"/>
           </a:p>
         </p:txBody>
       </p:sp>
@@ -17694,7 +17798,6 @@
               <a:rPr lang="en-US" altLang="en-US" sz="5400" dirty="0" smtClean="0"/>
               <a:t>events</a:t>
             </a:r>
-            <a:endParaRPr lang="en-US" altLang="en-US" sz="5400" dirty="0" smtClean="0"/>
           </a:p>
         </p:txBody>
       </p:sp>
@@ -17818,10 +17921,6 @@
               </a:rPr>
               <a:t>form&gt;</a:t>
             </a:r>
-            <a:endParaRPr lang="en-US" sz="2400" dirty="0">
-              <a:latin typeface="Courier New" panose="02070309020205020404" pitchFamily="49" charset="0"/>
-              <a:cs typeface="Courier New" panose="02070309020205020404" pitchFamily="49" charset="0"/>
-            </a:endParaRPr>
           </a:p>
         </p:txBody>
       </p:sp>
@@ -18056,7 +18155,6 @@
               <a:rPr lang="en-US" altLang="en-US" sz="5400" dirty="0" smtClean="0"/>
               <a:t>events</a:t>
             </a:r>
-            <a:endParaRPr lang="en-US" altLang="en-US" sz="5400" dirty="0" smtClean="0"/>
           </a:p>
         </p:txBody>
       </p:sp>
@@ -19576,14 +19674,12 @@
               <a:rPr lang="en-US" sz="2400" dirty="0" smtClean="0"/>
               <a:t>Document Object Model</a:t>
             </a:r>
-            <a:endParaRPr lang="en-US" sz="2400" dirty="0" smtClean="0"/>
           </a:p>
           <a:p>
             <a:r>
               <a:rPr lang="en-US" sz="2400" dirty="0" smtClean="0"/>
               <a:t>Accessing Elements</a:t>
             </a:r>
-            <a:endParaRPr lang="en-US" sz="2400" dirty="0" smtClean="0"/>
           </a:p>
           <a:p>
             <a:r>
@@ -19597,7 +19693,6 @@
               <a:rPr lang="en-US" sz="2400" dirty="0" smtClean="0"/>
               <a:t>Events</a:t>
             </a:r>
-            <a:endParaRPr lang="en-US" sz="2400" dirty="0" smtClean="0"/>
           </a:p>
           <a:p>
             <a:endParaRPr lang="en-US" dirty="0"/>
@@ -19997,7 +20092,6 @@
               <a:rPr lang="en-US" altLang="en-US" sz="5400" dirty="0" smtClean="0"/>
               <a:t>Accessing elements</a:t>
             </a:r>
-            <a:endParaRPr lang="en-US" altLang="en-US" sz="5400" dirty="0" smtClean="0"/>
           </a:p>
         </p:txBody>
       </p:sp>
@@ -20625,7 +20719,7 @@
   <a:extraClrSchemeLst/>
   <a:extLst>
     <a:ext uri="{05A4C25C-085E-4340-85A3-A5531E510DB2}">
-      <thm15:themeFamily xmlns="" xmlns:thm15="http://schemas.microsoft.com/office/thememl/2012/main" name="Badge" id="{71A07785-5930-41D4-9A83-E23602B48E98}" vid="{771EA782-DFA6-45B1-AEA3-661F1715B310}"/>
+      <thm15:themeFamily xmlns:thm15="http://schemas.microsoft.com/office/thememl/2012/main" xmlns="" name="Badge" id="{71A07785-5930-41D4-9A83-E23602B48E98}" vid="{771EA782-DFA6-45B1-AEA3-661F1715B310}"/>
     </a:ext>
   </a:extLst>
 </a:theme>

</xml_diff>

<commit_message>
Updates to notes and examples
</commit_message>
<xml_diff>
--- a/topic-04-JavaScript-3/talk-1/talk-1.pptx
+++ b/topic-04-JavaScript-3/talk-1/talk-1.pptx
@@ -5,7 +5,7 @@
     <p:sldMasterId id="2147483861" r:id="rId1"/>
   </p:sldMasterIdLst>
   <p:notesMasterIdLst>
-    <p:notesMasterId r:id="rId28"/>
+    <p:notesMasterId r:id="rId29"/>
   </p:notesMasterIdLst>
   <p:sldIdLst>
     <p:sldId id="283" r:id="rId2"/>
@@ -33,7 +33,8 @@
     <p:sldId id="357" r:id="rId24"/>
     <p:sldId id="358" r:id="rId25"/>
     <p:sldId id="359" r:id="rId26"/>
-    <p:sldId id="360" r:id="rId27"/>
+    <p:sldId id="364" r:id="rId27"/>
+    <p:sldId id="360" r:id="rId28"/>
   </p:sldIdLst>
   <p:sldSz cx="9144000" cy="6858000" type="screen4x3"/>
   <p:notesSz cx="6858000" cy="9144000"/>
@@ -134,7 +135,7 @@
   </p:defaultTextStyle>
   <p:extLst>
     <p:ext uri="{EFAFB233-063F-42B5-8137-9DF3F51BA10A}">
-      <p15:sldGuideLst xmlns:p15="http://schemas.microsoft.com/office/powerpoint/2012/main" xmlns="">
+      <p15:sldGuideLst xmlns="" xmlns:p15="http://schemas.microsoft.com/office/powerpoint/2012/main">
         <p15:guide id="1" orient="horz" pos="2160">
           <p15:clr>
             <a:srgbClr val="A4A3A4"/>
@@ -233,7 +234,7 @@
           <a:p>
             <a:fld id="{31E3A3E0-0EEC-43C3-B8B8-6A5D051024B7}" type="datetimeFigureOut">
               <a:rPr lang="en-US" smtClean="0"/>
-              <a:t>2/1/2018</a:t>
+              <a:t>2/2/2018</a:t>
             </a:fld>
             <a:endParaRPr lang="en-US"/>
           </a:p>
@@ -2549,7 +2550,7 @@
                 </a:solidFill>
               </a:rPr>
               <a:pPr/>
-              <a:t>26</a:t>
+              <a:t>27</a:t>
             </a:fld>
             <a:endParaRPr lang="en-US" altLang="en-US" sz="1200" smtClean="0">
               <a:solidFill>
@@ -5341,7 +5342,7 @@
           <a:p>
             <a:fld id="{4BC48473-ACCD-4242-806A-1249CC2C55A8}" type="datetimeFigureOut">
               <a:rPr lang="en-US" smtClean="0"/>
-              <a:t>2/1/2018</a:t>
+              <a:t>2/2/2018</a:t>
             </a:fld>
             <a:endParaRPr lang="en-US"/>
           </a:p>
@@ -5617,7 +5618,7 @@
           <a:p>
             <a:fld id="{4BC48473-ACCD-4242-806A-1249CC2C55A8}" type="datetimeFigureOut">
               <a:rPr lang="en-US" smtClean="0"/>
-              <a:t>2/1/2018</a:t>
+              <a:t>2/2/2018</a:t>
             </a:fld>
             <a:endParaRPr lang="en-US"/>
           </a:p>
@@ -5797,7 +5798,7 @@
           <a:p>
             <a:fld id="{4BC48473-ACCD-4242-806A-1249CC2C55A8}" type="datetimeFigureOut">
               <a:rPr lang="en-US" smtClean="0"/>
-              <a:t>2/1/2018</a:t>
+              <a:t>2/2/2018</a:t>
             </a:fld>
             <a:endParaRPr lang="en-US"/>
           </a:p>
@@ -5967,7 +5968,7 @@
           <a:p>
             <a:fld id="{4BC48473-ACCD-4242-806A-1249CC2C55A8}" type="datetimeFigureOut">
               <a:rPr lang="en-US" smtClean="0"/>
-              <a:t>2/1/2018</a:t>
+              <a:t>2/2/2018</a:t>
             </a:fld>
             <a:endParaRPr lang="en-US"/>
           </a:p>
@@ -6563,7 +6564,7 @@
           <a:p>
             <a:fld id="{4BC48473-ACCD-4242-806A-1249CC2C55A8}" type="datetimeFigureOut">
               <a:rPr lang="en-US" smtClean="0"/>
-              <a:t>2/1/2018</a:t>
+              <a:t>2/2/2018</a:t>
             </a:fld>
             <a:endParaRPr lang="en-US"/>
           </a:p>
@@ -8369,7 +8370,7 @@
           <a:p>
             <a:fld id="{4BC48473-ACCD-4242-806A-1249CC2C55A8}" type="datetimeFigureOut">
               <a:rPr lang="en-US" smtClean="0"/>
-              <a:t>2/1/2018</a:t>
+              <a:t>2/2/2018</a:t>
             </a:fld>
             <a:endParaRPr lang="en-US"/>
           </a:p>
@@ -8429,7 +8430,7 @@
   </p:clrMapOvr>
   <p:extLst mod="1">
     <p:ext uri="{DCECCB84-F9BA-43D5-87BE-67443E8EF086}">
-      <p15:sldGuideLst xmlns:p15="http://schemas.microsoft.com/office/powerpoint/2012/main" xmlns=""/>
+      <p15:sldGuideLst xmlns="" xmlns:p15="http://schemas.microsoft.com/office/powerpoint/2012/main"/>
     </p:ext>
   </p:extLst>
 </p:sldLayout>
@@ -8759,7 +8760,7 @@
           <a:p>
             <a:fld id="{4BC48473-ACCD-4242-806A-1249CC2C55A8}" type="datetimeFigureOut">
               <a:rPr lang="en-US" smtClean="0"/>
-              <a:t>2/1/2018</a:t>
+              <a:t>2/2/2018</a:t>
             </a:fld>
             <a:endParaRPr lang="en-US"/>
           </a:p>
@@ -8819,7 +8820,7 @@
   </p:clrMapOvr>
   <p:extLst mod="1">
     <p:ext uri="{DCECCB84-F9BA-43D5-87BE-67443E8EF086}">
-      <p15:sldGuideLst xmlns:p15="http://schemas.microsoft.com/office/powerpoint/2012/main" xmlns=""/>
+      <p15:sldGuideLst xmlns="" xmlns:p15="http://schemas.microsoft.com/office/powerpoint/2012/main"/>
     </p:ext>
   </p:extLst>
 </p:sldLayout>
@@ -8882,7 +8883,7 @@
           <a:p>
             <a:fld id="{4BC48473-ACCD-4242-806A-1249CC2C55A8}" type="datetimeFigureOut">
               <a:rPr lang="en-US" smtClean="0"/>
-              <a:t>2/1/2018</a:t>
+              <a:t>2/2/2018</a:t>
             </a:fld>
             <a:endParaRPr lang="en-US"/>
           </a:p>
@@ -8977,7 +8978,7 @@
           <a:p>
             <a:fld id="{4BC48473-ACCD-4242-806A-1249CC2C55A8}" type="datetimeFigureOut">
               <a:rPr lang="en-US" smtClean="0"/>
-              <a:t>2/1/2018</a:t>
+              <a:t>2/2/2018</a:t>
             </a:fld>
             <a:endParaRPr lang="en-US"/>
           </a:p>
@@ -9742,7 +9743,7 @@
           <a:p>
             <a:fld id="{4BC48473-ACCD-4242-806A-1249CC2C55A8}" type="datetimeFigureOut">
               <a:rPr lang="en-US" smtClean="0"/>
-              <a:t>2/1/2018</a:t>
+              <a:t>2/2/2018</a:t>
             </a:fld>
             <a:endParaRPr lang="en-US"/>
           </a:p>
@@ -9888,7 +9889,7 @@
   </p:clrMapOvr>
   <p:extLst mod="1">
     <p:ext uri="{DCECCB84-F9BA-43D5-87BE-67443E8EF086}">
-      <p15:sldGuideLst xmlns:p15="http://schemas.microsoft.com/office/powerpoint/2012/main" xmlns="">
+      <p15:sldGuideLst xmlns="" xmlns:p15="http://schemas.microsoft.com/office/powerpoint/2012/main">
         <p15:guide id="1" orient="horz" pos="696">
           <p15:clr>
             <a:srgbClr val="FBAE40"/>
@@ -10622,7 +10623,7 @@
           <a:p>
             <a:fld id="{4BC48473-ACCD-4242-806A-1249CC2C55A8}" type="datetimeFigureOut">
               <a:rPr lang="en-US" smtClean="0"/>
-              <a:t>2/1/2018</a:t>
+              <a:t>2/2/2018</a:t>
             </a:fld>
             <a:endParaRPr lang="en-US"/>
           </a:p>
@@ -10887,7 +10888,7 @@
           <a:p>
             <a:fld id="{4BC48473-ACCD-4242-806A-1249CC2C55A8}" type="datetimeFigureOut">
               <a:rPr lang="en-US" smtClean="0"/>
-              <a:t>2/1/2018</a:t>
+              <a:t>2/2/2018</a:t>
             </a:fld>
             <a:endParaRPr lang="en-US"/>
           </a:p>
@@ -11505,7 +11506,7 @@
   </p:txStyles>
   <p:extLst mod="1">
     <p:ext uri="{27BBF7A9-308A-43DC-89C8-2F10F3537804}">
-      <p15:sldGuideLst xmlns:p15="http://schemas.microsoft.com/office/powerpoint/2012/main" xmlns="">
+      <p15:sldGuideLst xmlns="" xmlns:p15="http://schemas.microsoft.com/office/powerpoint/2012/main">
         <p15:guide id="1" pos="792">
           <p15:clr>
             <a:srgbClr val="F26B43"/>
@@ -17953,6 +17954,172 @@
 </file>
 
 <file path=ppt/slides/slide26.xml><?xml version="1.0" encoding="utf-8"?>
+<p:sld xmlns:a="http://schemas.openxmlformats.org/drawingml/2006/main" xmlns:r="http://schemas.openxmlformats.org/officeDocument/2006/relationships" xmlns:p="http://schemas.openxmlformats.org/presentationml/2006/main">
+  <p:cSld>
+    <p:spTree>
+      <p:nvGrpSpPr>
+        <p:cNvPr id="1" name=""/>
+        <p:cNvGrpSpPr/>
+        <p:nvPr/>
+      </p:nvGrpSpPr>
+      <p:grpSpPr>
+        <a:xfrm>
+          <a:off x="0" y="0"/>
+          <a:ext cx="0" cy="0"/>
+          <a:chOff x="0" y="0"/>
+          <a:chExt cx="0" cy="0"/>
+        </a:xfrm>
+      </p:grpSpPr>
+      <p:sp>
+        <p:nvSpPr>
+          <p:cNvPr id="2" name="Title 1"/>
+          <p:cNvSpPr>
+            <a:spLocks noGrp="1"/>
+          </p:cNvSpPr>
+          <p:nvPr>
+            <p:ph type="title"/>
+          </p:nvPr>
+        </p:nvSpPr>
+        <p:spPr/>
+        <p:txBody>
+          <a:bodyPr/>
+          <a:lstStyle/>
+          <a:p>
+            <a:r>
+              <a:rPr lang="en-US" altLang="en-US" sz="4800" dirty="0"/>
+              <a:t>events</a:t>
+            </a:r>
+            <a:endParaRPr lang="en-US" dirty="0"/>
+          </a:p>
+        </p:txBody>
+      </p:sp>
+      <p:sp>
+        <p:nvSpPr>
+          <p:cNvPr id="3" name="Content Placeholder 2"/>
+          <p:cNvSpPr>
+            <a:spLocks noGrp="1"/>
+          </p:cNvSpPr>
+          <p:nvPr>
+            <p:ph idx="1"/>
+          </p:nvPr>
+        </p:nvSpPr>
+        <p:spPr/>
+        <p:txBody>
+          <a:bodyPr/>
+          <a:lstStyle/>
+          <a:p>
+            <a:endParaRPr lang="en-US" dirty="0"/>
+          </a:p>
+          <a:p>
+            <a:pPr marL="0" indent="0">
+              <a:buNone/>
+            </a:pPr>
+            <a:r>
+              <a:rPr lang="en-US" sz="2400" dirty="0" err="1">
+                <a:latin typeface="Courier New" panose="02070309020205020404" pitchFamily="49" charset="0"/>
+                <a:cs typeface="Courier New" panose="02070309020205020404" pitchFamily="49" charset="0"/>
+              </a:rPr>
+              <a:t>var</a:t>
+            </a:r>
+            <a:r>
+              <a:rPr lang="en-US" sz="2400" dirty="0">
+                <a:latin typeface="Courier New" panose="02070309020205020404" pitchFamily="49" charset="0"/>
+                <a:cs typeface="Courier New" panose="02070309020205020404" pitchFamily="49" charset="0"/>
+              </a:rPr>
+              <a:t> </a:t>
+            </a:r>
+            <a:r>
+              <a:rPr lang="en-US" sz="2400" dirty="0" err="1">
+                <a:latin typeface="Courier New" panose="02070309020205020404" pitchFamily="49" charset="0"/>
+                <a:cs typeface="Courier New" panose="02070309020205020404" pitchFamily="49" charset="0"/>
+              </a:rPr>
+              <a:t>elUsername</a:t>
+            </a:r>
+            <a:r>
+              <a:rPr lang="en-US" sz="2400" dirty="0">
+                <a:latin typeface="Courier New" panose="02070309020205020404" pitchFamily="49" charset="0"/>
+                <a:cs typeface="Courier New" panose="02070309020205020404" pitchFamily="49" charset="0"/>
+              </a:rPr>
+              <a:t> = </a:t>
+            </a:r>
+            <a:r>
+              <a:rPr lang="en-US" sz="2400" dirty="0" err="1">
+                <a:latin typeface="Courier New" panose="02070309020205020404" pitchFamily="49" charset="0"/>
+                <a:cs typeface="Courier New" panose="02070309020205020404" pitchFamily="49" charset="0"/>
+              </a:rPr>
+              <a:t>document.getElementById</a:t>
+            </a:r>
+            <a:r>
+              <a:rPr lang="en-US" sz="2400" dirty="0">
+                <a:latin typeface="Courier New" panose="02070309020205020404" pitchFamily="49" charset="0"/>
+                <a:cs typeface="Courier New" panose="02070309020205020404" pitchFamily="49" charset="0"/>
+              </a:rPr>
+              <a:t>('username');  </a:t>
+            </a:r>
+            <a:endParaRPr lang="en-US" sz="2400" dirty="0" smtClean="0">
+              <a:latin typeface="Courier New" panose="02070309020205020404" pitchFamily="49" charset="0"/>
+              <a:cs typeface="Courier New" panose="02070309020205020404" pitchFamily="49" charset="0"/>
+            </a:endParaRPr>
+          </a:p>
+          <a:p>
+            <a:pPr marL="0" indent="0">
+              <a:buNone/>
+            </a:pPr>
+            <a:r>
+              <a:rPr lang="en-US" sz="2400" dirty="0" err="1" smtClean="0">
+                <a:latin typeface="Courier New" panose="02070309020205020404" pitchFamily="49" charset="0"/>
+                <a:cs typeface="Courier New" panose="02070309020205020404" pitchFamily="49" charset="0"/>
+              </a:rPr>
+              <a:t>elUsername.addEventListener</a:t>
+            </a:r>
+            <a:r>
+              <a:rPr lang="en-US" sz="2400" dirty="0">
+                <a:latin typeface="Courier New" panose="02070309020205020404" pitchFamily="49" charset="0"/>
+                <a:cs typeface="Courier New" panose="02070309020205020404" pitchFamily="49" charset="0"/>
+              </a:rPr>
+              <a:t>('blur', </a:t>
+            </a:r>
+            <a:r>
+              <a:rPr lang="en-US" sz="2400" dirty="0" err="1">
+                <a:latin typeface="Courier New" panose="02070309020205020404" pitchFamily="49" charset="0"/>
+                <a:cs typeface="Courier New" panose="02070309020205020404" pitchFamily="49" charset="0"/>
+              </a:rPr>
+              <a:t>checkUsername</a:t>
+            </a:r>
+            <a:r>
+              <a:rPr lang="en-US" sz="2400" dirty="0">
+                <a:latin typeface="Courier New" panose="02070309020205020404" pitchFamily="49" charset="0"/>
+                <a:cs typeface="Courier New" panose="02070309020205020404" pitchFamily="49" charset="0"/>
+              </a:rPr>
+              <a:t>, false);</a:t>
+            </a:r>
+          </a:p>
+          <a:p>
+            <a:endParaRPr lang="en-US" dirty="0"/>
+          </a:p>
+        </p:txBody>
+      </p:sp>
+    </p:spTree>
+    <p:extLst>
+      <p:ext uri="{BB962C8B-B14F-4D97-AF65-F5344CB8AC3E}">
+        <p14:creationId xmlns:p14="http://schemas.microsoft.com/office/powerpoint/2010/main" val="1649321425"/>
+      </p:ext>
+    </p:extLst>
+  </p:cSld>
+  <p:clrMapOvr>
+    <a:masterClrMapping/>
+  </p:clrMapOvr>
+  <p:timing>
+    <p:tnLst>
+      <p:par>
+        <p:cTn id="1" dur="indefinite" restart="never" nodeType="tmRoot"/>
+      </p:par>
+    </p:tnLst>
+  </p:timing>
+</p:sld>
+</file>
+
+<file path=ppt/slides/slide27.xml><?xml version="1.0" encoding="utf-8"?>
 <p:sld xmlns:a="http://schemas.openxmlformats.org/drawingml/2006/main" xmlns:r="http://schemas.openxmlformats.org/officeDocument/2006/relationships" xmlns:p="http://schemas.openxmlformats.org/presentationml/2006/main" showMasterPhAnim="0">
   <p:cSld>
     <p:spTree>
@@ -18123,7 +18290,7 @@
                 <a:buFontTx/>
                 <a:buNone/>
               </a:pPr>
-              <a:t>26</a:t>
+              <a:t>27</a:t>
             </a:fld>
             <a:endParaRPr lang="en-US" altLang="en-US" sz="1400" smtClean="0"/>
           </a:p>
@@ -20719,7 +20886,7 @@
   <a:extraClrSchemeLst/>
   <a:extLst>
     <a:ext uri="{05A4C25C-085E-4340-85A3-A5531E510DB2}">
-      <thm15:themeFamily xmlns:thm15="http://schemas.microsoft.com/office/thememl/2012/main" xmlns="" name="Badge" id="{71A07785-5930-41D4-9A83-E23602B48E98}" vid="{771EA782-DFA6-45B1-AEA3-661F1715B310}"/>
+      <thm15:themeFamily xmlns="" xmlns:thm15="http://schemas.microsoft.com/office/thememl/2012/main" name="Badge" id="{71A07785-5930-41D4-9A83-E23602B48E98}" vid="{771EA782-DFA6-45B1-AEA3-661F1715B310}"/>
     </a:ext>
   </a:extLst>
 </a:theme>

</xml_diff>